<commit_message>
commit at end of period
</commit_message>
<xml_diff>
--- a/kata-calc.pptx
+++ b/kata-calc.pptx
@@ -5,13 +5,12 @@
     <p:sldMasterId id="2147483648" r:id="rId1"/>
   </p:sldMasterIdLst>
   <p:sldIdLst>
-    <p:sldId id="256" r:id="rId2"/>
-    <p:sldId id="257" r:id="rId3"/>
-    <p:sldId id="258" r:id="rId4"/>
-    <p:sldId id="259" r:id="rId5"/>
-    <p:sldId id="260" r:id="rId6"/>
-    <p:sldId id="261" r:id="rId7"/>
-    <p:sldId id="262" r:id="rId8"/>
+    <p:sldId id="257" r:id="rId2"/>
+    <p:sldId id="258" r:id="rId3"/>
+    <p:sldId id="259" r:id="rId4"/>
+    <p:sldId id="260" r:id="rId5"/>
+    <p:sldId id="261" r:id="rId6"/>
+    <p:sldId id="262" r:id="rId7"/>
   </p:sldIdLst>
   <p:sldSz cx="9144000" cy="6858000" type="screen4x3"/>
   <p:notesSz cx="7010400" cy="9296400"/>
@@ -295,7 +294,7 @@
             <a:fld id="{AD254CC8-624D-49FC-BACD-09FEC27DDD78}" type="datetimeFigureOut">
               <a:rPr lang="en-US" smtClean="0"/>
               <a:pPr/>
-              <a:t>4/13/2012</a:t>
+              <a:t>4/20/2012</a:t>
             </a:fld>
             <a:endParaRPr lang="en-US"/>
           </a:p>
@@ -462,7 +461,7 @@
             <a:fld id="{AD254CC8-624D-49FC-BACD-09FEC27DDD78}" type="datetimeFigureOut">
               <a:rPr lang="en-US" smtClean="0"/>
               <a:pPr/>
-              <a:t>4/13/2012</a:t>
+              <a:t>4/20/2012</a:t>
             </a:fld>
             <a:endParaRPr lang="en-US"/>
           </a:p>
@@ -639,7 +638,7 @@
             <a:fld id="{AD254CC8-624D-49FC-BACD-09FEC27DDD78}" type="datetimeFigureOut">
               <a:rPr lang="en-US" smtClean="0"/>
               <a:pPr/>
-              <a:t>4/13/2012</a:t>
+              <a:t>4/20/2012</a:t>
             </a:fld>
             <a:endParaRPr lang="en-US"/>
           </a:p>
@@ -806,7 +805,7 @@
             <a:fld id="{AD254CC8-624D-49FC-BACD-09FEC27DDD78}" type="datetimeFigureOut">
               <a:rPr lang="en-US" smtClean="0"/>
               <a:pPr/>
-              <a:t>4/13/2012</a:t>
+              <a:t>4/20/2012</a:t>
             </a:fld>
             <a:endParaRPr lang="en-US"/>
           </a:p>
@@ -1049,7 +1048,7 @@
             <a:fld id="{AD254CC8-624D-49FC-BACD-09FEC27DDD78}" type="datetimeFigureOut">
               <a:rPr lang="en-US" smtClean="0"/>
               <a:pPr/>
-              <a:t>4/13/2012</a:t>
+              <a:t>4/20/2012</a:t>
             </a:fld>
             <a:endParaRPr lang="en-US"/>
           </a:p>
@@ -1334,7 +1333,7 @@
             <a:fld id="{AD254CC8-624D-49FC-BACD-09FEC27DDD78}" type="datetimeFigureOut">
               <a:rPr lang="en-US" smtClean="0"/>
               <a:pPr/>
-              <a:t>4/13/2012</a:t>
+              <a:t>4/20/2012</a:t>
             </a:fld>
             <a:endParaRPr lang="en-US"/>
           </a:p>
@@ -1753,7 +1752,7 @@
             <a:fld id="{AD254CC8-624D-49FC-BACD-09FEC27DDD78}" type="datetimeFigureOut">
               <a:rPr lang="en-US" smtClean="0"/>
               <a:pPr/>
-              <a:t>4/13/2012</a:t>
+              <a:t>4/20/2012</a:t>
             </a:fld>
             <a:endParaRPr lang="en-US"/>
           </a:p>
@@ -1868,7 +1867,7 @@
             <a:fld id="{AD254CC8-624D-49FC-BACD-09FEC27DDD78}" type="datetimeFigureOut">
               <a:rPr lang="en-US" smtClean="0"/>
               <a:pPr/>
-              <a:t>4/13/2012</a:t>
+              <a:t>4/20/2012</a:t>
             </a:fld>
             <a:endParaRPr lang="en-US"/>
           </a:p>
@@ -1960,7 +1959,7 @@
             <a:fld id="{AD254CC8-624D-49FC-BACD-09FEC27DDD78}" type="datetimeFigureOut">
               <a:rPr lang="en-US" smtClean="0"/>
               <a:pPr/>
-              <a:t>4/13/2012</a:t>
+              <a:t>4/20/2012</a:t>
             </a:fld>
             <a:endParaRPr lang="en-US"/>
           </a:p>
@@ -2234,7 +2233,7 @@
             <a:fld id="{AD254CC8-624D-49FC-BACD-09FEC27DDD78}" type="datetimeFigureOut">
               <a:rPr lang="en-US" smtClean="0"/>
               <a:pPr/>
-              <a:t>4/13/2012</a:t>
+              <a:t>4/20/2012</a:t>
             </a:fld>
             <a:endParaRPr lang="en-US"/>
           </a:p>
@@ -2484,7 +2483,7 @@
             <a:fld id="{AD254CC8-624D-49FC-BACD-09FEC27DDD78}" type="datetimeFigureOut">
               <a:rPr lang="en-US" smtClean="0"/>
               <a:pPr/>
-              <a:t>4/13/2012</a:t>
+              <a:t>4/20/2012</a:t>
             </a:fld>
             <a:endParaRPr lang="en-US"/>
           </a:p>
@@ -2694,7 +2693,7 @@
             <a:fld id="{AD254CC8-624D-49FC-BACD-09FEC27DDD78}" type="datetimeFigureOut">
               <a:rPr lang="en-US" smtClean="0"/>
               <a:pPr/>
-              <a:t>4/13/2012</a:t>
+              <a:t>4/20/2012</a:t>
             </a:fld>
             <a:endParaRPr lang="en-US"/>
           </a:p>
@@ -3067,7 +3066,7 @@
       </p:grpSpPr>
       <p:sp>
         <p:nvSpPr>
-          <p:cNvPr id="4" name="Title 3"/>
+          <p:cNvPr id="2" name="Title 1"/>
           <p:cNvSpPr>
             <a:spLocks noGrp="1"/>
           </p:cNvSpPr>
@@ -3080,13 +3079,13 @@
           <a:bodyPr/>
           <a:lstStyle/>
           <a:p>
-            <a:endParaRPr lang="en-US"/>
-          </a:p>
-        </p:txBody>
-      </p:sp>
-      <p:sp>
-        <p:nvSpPr>
-          <p:cNvPr id="5" name="Content Placeholder 4"/>
+            <a:endParaRPr lang="en-US" dirty="0"/>
+          </a:p>
+        </p:txBody>
+      </p:sp>
+      <p:sp>
+        <p:nvSpPr>
+          <p:cNvPr id="3" name="Content Placeholder 2"/>
           <p:cNvSpPr>
             <a:spLocks noGrp="1"/>
           </p:cNvSpPr>
@@ -3096,43 +3095,81 @@
         </p:nvSpPr>
         <p:spPr/>
         <p:txBody>
-          <a:bodyPr/>
-          <a:lstStyle/>
-          <a:p>
+          <a:bodyPr>
+            <a:normAutofit/>
+          </a:bodyPr>
+          <a:lstStyle/>
+          <a:p>
+            <a:pPr>
+              <a:buNone/>
+            </a:pPr>
+            <a:r>
+              <a:rPr lang="en-US" dirty="0" smtClean="0"/>
+              <a:t>1  Create </a:t>
+            </a:r>
             <a:r>
               <a:rPr lang="en-US" dirty="0"/>
-              <a:t>Try not to read ahead.</a:t>
-            </a:r>
-          </a:p>
-          <a:p>
+              <a:t>a simple String calculator with a method </a:t>
+            </a:r>
+            <a:r>
+              <a:rPr lang="en-US" b="1" dirty="0" err="1"/>
+              <a:t>int</a:t>
+            </a:r>
+            <a:r>
+              <a:rPr lang="en-US" b="1" dirty="0"/>
+              <a:t> Add(string numbers</a:t>
+            </a:r>
+            <a:r>
+              <a:rPr lang="en-US" b="1" dirty="0" smtClean="0"/>
+              <a:t>)</a:t>
+            </a:r>
+          </a:p>
+          <a:p>
+            <a:pPr lvl="1"/>
+            <a:r>
+              <a:rPr lang="en-US" dirty="0" smtClean="0"/>
+              <a:t>The </a:t>
+            </a:r>
             <a:r>
               <a:rPr lang="en-US" dirty="0"/>
-              <a:t>Do one task at a time. The trick is to learn to work incrementally.</a:t>
-            </a:r>
-          </a:p>
-          <a:p>
+              <a:t>method can take 0, 1 or 2 numbers, and will return their sum (for an empty string it will return 0) for example</a:t>
+            </a:r>
+            <a:r>
+              <a:rPr lang="en-US" b="1" dirty="0"/>
+              <a:t> “” or “1” or “1,2”</a:t>
+            </a:r>
+            <a:endParaRPr lang="en-US" dirty="0"/>
+          </a:p>
+          <a:p>
+            <a:pPr lvl="2"/>
             <a:r>
               <a:rPr lang="en-US" dirty="0"/>
-              <a:t>Make sure you only test for</a:t>
-            </a:r>
-            <a:r>
-              <a:rPr lang="en-US" b="1" dirty="0"/>
-              <a:t> correct inputs</a:t>
-            </a:r>
+              <a:t>Start with the simplest test case of an empty string and move to 1 and two numbers</a:t>
+            </a:r>
+          </a:p>
+          <a:p>
+            <a:pPr lvl="2"/>
             <a:r>
               <a:rPr lang="en-US" dirty="0"/>
-              <a:t>. there is no need to test for invalid inputs for this </a:t>
+              <a:t>Remember to solve things as simply as possible so that you force yourself to write tests you did not think about</a:t>
+            </a:r>
+          </a:p>
+          <a:p>
+            <a:pPr lvl="2"/>
+            <a:r>
+              <a:rPr lang="en-US" dirty="0"/>
+              <a:t>Remember to </a:t>
             </a:r>
             <a:r>
               <a:rPr lang="en-US" dirty="0" err="1"/>
-              <a:t>kata</a:t>
-            </a:r>
-            <a:endParaRPr lang="en-US" dirty="0"/>
-          </a:p>
-          <a:p>
-            <a:pPr>
-              <a:buNone/>
-            </a:pPr>
+              <a:t>refactor</a:t>
+            </a:r>
+            <a:r>
+              <a:rPr lang="en-US" dirty="0"/>
+              <a:t> after each passing test</a:t>
+            </a:r>
+          </a:p>
+          <a:p>
             <a:endParaRPr lang="en-US" dirty="0"/>
           </a:p>
         </p:txBody>
@@ -3184,6 +3221,10 @@
           <a:bodyPr/>
           <a:lstStyle/>
           <a:p>
+            <a:r>
+              <a:rPr lang="en-US" dirty="0" smtClean="0"/>
+              <a:t>2</a:t>
+            </a:r>
             <a:endParaRPr lang="en-US" dirty="0"/>
           </a:p>
         </p:txBody>
@@ -3200,82 +3241,13 @@
         </p:nvSpPr>
         <p:spPr/>
         <p:txBody>
-          <a:bodyPr>
-            <a:normAutofit/>
-          </a:bodyPr>
-          <a:lstStyle/>
-          <a:p>
-            <a:pPr>
-              <a:buNone/>
-            </a:pPr>
-            <a:r>
-              <a:rPr lang="en-US" dirty="0" smtClean="0"/>
-              <a:t>1  Create </a:t>
-            </a:r>
+          <a:bodyPr/>
+          <a:lstStyle/>
+          <a:p>
             <a:r>
               <a:rPr lang="en-US" dirty="0"/>
-              <a:t>a simple String calculator with a method </a:t>
-            </a:r>
-            <a:r>
-              <a:rPr lang="en-US" b="1" dirty="0" err="1"/>
-              <a:t>int</a:t>
-            </a:r>
-            <a:r>
-              <a:rPr lang="en-US" b="1" dirty="0"/>
-              <a:t> Add(string numbers</a:t>
-            </a:r>
-            <a:r>
-              <a:rPr lang="en-US" b="1" dirty="0" smtClean="0"/>
-              <a:t>)</a:t>
-            </a:r>
-          </a:p>
-          <a:p>
-            <a:pPr lvl="1"/>
-            <a:r>
-              <a:rPr lang="en-US" dirty="0" smtClean="0"/>
-              <a:t>The </a:t>
-            </a:r>
-            <a:r>
-              <a:rPr lang="en-US" dirty="0"/>
-              <a:t>method can take 0, 1 or 2 numbers, and will return their sum (for an empty string it will return 0) for example</a:t>
-            </a:r>
-            <a:r>
-              <a:rPr lang="en-US" b="1" dirty="0"/>
-              <a:t> “” or “1” or “1,2”</a:t>
-            </a:r>
-            <a:endParaRPr lang="en-US" dirty="0"/>
-          </a:p>
-          <a:p>
-            <a:pPr lvl="2"/>
-            <a:r>
-              <a:rPr lang="en-US" dirty="0"/>
-              <a:t>Start with the simplest test case of an empty string and move to 1 and two numbers</a:t>
-            </a:r>
-          </a:p>
-          <a:p>
-            <a:pPr lvl="2"/>
-            <a:r>
-              <a:rPr lang="en-US" dirty="0"/>
-              <a:t>Remember to solve things as simply as possible so that you force yourself to write tests you did not think about</a:t>
-            </a:r>
-          </a:p>
-          <a:p>
-            <a:pPr lvl="2"/>
-            <a:r>
-              <a:rPr lang="en-US" dirty="0"/>
-              <a:t>Remember to </a:t>
-            </a:r>
-            <a:r>
-              <a:rPr lang="en-US" dirty="0" err="1"/>
-              <a:t>refactor</a:t>
-            </a:r>
-            <a:r>
-              <a:rPr lang="en-US" dirty="0"/>
-              <a:t> after each passing test</a:t>
-            </a:r>
-          </a:p>
-          <a:p>
-            <a:endParaRPr lang="en-US" dirty="0"/>
+              <a:t>Allow the Add method to handle an unknown amount of numbers</a:t>
+            </a:r>
           </a:p>
         </p:txBody>
       </p:sp>
@@ -3328,7 +3300,7 @@
           <a:p>
             <a:r>
               <a:rPr lang="en-US" dirty="0" smtClean="0"/>
-              <a:t>2</a:t>
+              <a:t>3</a:t>
             </a:r>
             <a:endParaRPr lang="en-US" dirty="0"/>
           </a:p>
@@ -3351,8 +3323,33 @@
           <a:p>
             <a:r>
               <a:rPr lang="en-US" dirty="0"/>
-              <a:t>Allow the Add method to handle an unknown amount of numbers</a:t>
-            </a:r>
+              <a:t>Allow the Add method to handle new lines between numbers (instead of commas</a:t>
+            </a:r>
+            <a:r>
+              <a:rPr lang="en-US" dirty="0" smtClean="0"/>
+              <a:t>).</a:t>
+            </a:r>
+          </a:p>
+          <a:p>
+            <a:pPr lvl="1"/>
+            <a:r>
+              <a:rPr lang="en-US" dirty="0" smtClean="0"/>
+              <a:t>the </a:t>
+            </a:r>
+            <a:r>
+              <a:rPr lang="en-US" dirty="0"/>
+              <a:t>following input is ok:  “1\n2,3”  (will equal 6)</a:t>
+            </a:r>
+          </a:p>
+          <a:p>
+            <a:pPr lvl="1"/>
+            <a:r>
+              <a:rPr lang="en-US" dirty="0"/>
+              <a:t>the following input is NOT ok:  “1,\n” (not need to prove it - just clarifying)</a:t>
+            </a:r>
+          </a:p>
+          <a:p>
+            <a:endParaRPr lang="en-US" dirty="0"/>
           </a:p>
         </p:txBody>
       </p:sp>
@@ -3361,6 +3358,13 @@
   <p:clrMapOvr>
     <a:masterClrMapping/>
   </p:clrMapOvr>
+  <p:timing>
+    <p:tnLst>
+      <p:par>
+        <p:cTn id="1" dur="indefinite" restart="never" nodeType="tmRoot"/>
+      </p:par>
+    </p:tnLst>
+  </p:timing>
 </p:sld>
 </file>
 
@@ -3398,7 +3402,7 @@
           <a:p>
             <a:r>
               <a:rPr lang="en-US" dirty="0" smtClean="0"/>
-              <a:t>3</a:t>
+              <a:t>4</a:t>
             </a:r>
             <a:endParaRPr lang="en-US" dirty="0"/>
           </a:p>
@@ -3416,17 +3420,32 @@
         </p:nvSpPr>
         <p:spPr/>
         <p:txBody>
-          <a:bodyPr/>
-          <a:lstStyle/>
-          <a:p>
+          <a:bodyPr>
+            <a:normAutofit/>
+          </a:bodyPr>
+          <a:lstStyle/>
+          <a:p>
+            <a:r>
+              <a:rPr lang="en-US" b="1" dirty="0"/>
+              <a:t>Support </a:t>
+            </a:r>
+            <a:r>
+              <a:rPr lang="en-US" b="1"/>
+              <a:t>different </a:t>
+            </a:r>
+            <a:r>
+              <a:rPr lang="en-US" b="1" smtClean="0"/>
+              <a:t>delimiters </a:t>
+            </a:r>
+            <a:r>
+              <a:rPr lang="en-US" smtClean="0"/>
+              <a:t>to </a:t>
+            </a:r>
             <a:r>
               <a:rPr lang="en-US" dirty="0"/>
-              <a:t>Allow the Add method to handle new lines between numbers (instead of commas</a:t>
-            </a:r>
-            <a:r>
-              <a:rPr lang="en-US" dirty="0" smtClean="0"/>
-              <a:t>).</a:t>
-            </a:r>
+              <a:t>change a delimiter, </a:t>
+            </a:r>
+            <a:endParaRPr lang="en-US" dirty="0" smtClean="0"/>
           </a:p>
           <a:p>
             <a:pPr lvl="1"/>
@@ -3436,14 +3455,54 @@
             </a:r>
             <a:r>
               <a:rPr lang="en-US" dirty="0"/>
-              <a:t>following input is ok:  “1\n2,3”  (will equal 6)</a:t>
+              <a:t>beginning of the string will contain a separate line that looks </a:t>
+            </a:r>
+            <a:r>
+              <a:rPr lang="en-US" dirty="0" smtClean="0"/>
+              <a:t>like this</a:t>
+            </a:r>
+            <a:r>
+              <a:rPr lang="en-US" dirty="0"/>
+              <a:t>:   </a:t>
+            </a:r>
+            <a:endParaRPr lang="en-US" dirty="0" smtClean="0"/>
+          </a:p>
+          <a:p>
+            <a:pPr lvl="2"/>
+            <a:r>
+              <a:rPr lang="en-US" dirty="0" smtClean="0"/>
+              <a:t>“//[</a:t>
+            </a:r>
+            <a:r>
+              <a:rPr lang="en-US" dirty="0"/>
+              <a:t>delimiter]\n[numbers…]” </a:t>
+            </a:r>
+            <a:endParaRPr lang="en-US" dirty="0" smtClean="0"/>
+          </a:p>
+          <a:p>
+            <a:pPr lvl="3"/>
+            <a:r>
+              <a:rPr lang="en-US" dirty="0" smtClean="0"/>
+              <a:t>for </a:t>
+            </a:r>
+            <a:r>
+              <a:rPr lang="en-US" dirty="0"/>
+              <a:t>example </a:t>
+            </a:r>
+            <a:r>
+              <a:rPr lang="en-US" dirty="0" smtClean="0"/>
+              <a:t>“//;\n1;2</a:t>
+            </a:r>
+            <a:r>
+              <a:rPr lang="en-US" dirty="0"/>
+              <a:t>” should return three where the default delimiter is ‘;’ .</a:t>
             </a:r>
           </a:p>
           <a:p>
             <a:pPr lvl="1"/>
             <a:r>
               <a:rPr lang="en-US" dirty="0"/>
-              <a:t>the following input is NOT ok:  “1,\n” (not need to prove it - just clarifying)</a:t>
+              <a:t>the first line is optional. all existing scenarios should still be supported</a:t>
             </a:r>
           </a:p>
           <a:p>
@@ -3456,6 +3515,13 @@
   <p:clrMapOvr>
     <a:masterClrMapping/>
   </p:clrMapOvr>
+  <p:timing>
+    <p:tnLst>
+      <p:par>
+        <p:cTn id="1" dur="indefinite" restart="never" nodeType="tmRoot"/>
+      </p:par>
+    </p:tnLst>
+  </p:timing>
 </p:sld>
 </file>
 
@@ -3493,7 +3559,7 @@
           <a:p>
             <a:r>
               <a:rPr lang="en-US" dirty="0" smtClean="0"/>
-              <a:t>4</a:t>
+              <a:t>5</a:t>
             </a:r>
             <a:endParaRPr lang="en-US" dirty="0"/>
           </a:p>
@@ -3511,30 +3577,12 @@
         </p:nvSpPr>
         <p:spPr/>
         <p:txBody>
-          <a:bodyPr>
-            <a:normAutofit/>
-          </a:bodyPr>
-          <a:lstStyle/>
-          <a:p>
-            <a:r>
-              <a:rPr lang="en-US" b="1" dirty="0"/>
-              <a:t>Support </a:t>
-            </a:r>
-            <a:r>
-              <a:rPr lang="en-US" b="1"/>
-              <a:t>different </a:t>
-            </a:r>
-            <a:r>
-              <a:rPr lang="en-US" b="1" smtClean="0"/>
-              <a:t>delimiters </a:t>
-            </a:r>
-            <a:r>
-              <a:rPr lang="en-US" smtClean="0"/>
-              <a:t>to </a:t>
-            </a:r>
+          <a:bodyPr/>
+          <a:lstStyle/>
+          <a:p>
             <a:r>
               <a:rPr lang="en-US" dirty="0"/>
-              <a:t>change a delimiter, </a:t>
+              <a:t>Calling Add with a negative number will throw an exception “negatives not allowed” </a:t>
             </a:r>
             <a:endParaRPr lang="en-US" dirty="0" smtClean="0"/>
           </a:p>
@@ -3542,66 +3590,20 @@
             <a:pPr lvl="1"/>
             <a:r>
               <a:rPr lang="en-US" dirty="0" smtClean="0"/>
-              <a:t>the </a:t>
+              <a:t>and </a:t>
             </a:r>
             <a:r>
               <a:rPr lang="en-US" dirty="0"/>
-              <a:t>beginning of the string will contain a separate line that looks </a:t>
-            </a:r>
-            <a:r>
-              <a:rPr lang="en-US" dirty="0" smtClean="0"/>
-              <a:t>like this</a:t>
+              <a:t>the negative that was </a:t>
+            </a:r>
+            <a:r>
+              <a:rPr lang="en-US" dirty="0" err="1"/>
+              <a:t>passed.if</a:t>
             </a:r>
             <a:r>
               <a:rPr lang="en-US" dirty="0"/>
-              <a:t>:   </a:t>
-            </a:r>
-            <a:endParaRPr lang="en-US" dirty="0" smtClean="0"/>
-          </a:p>
-          <a:p>
-            <a:pPr lvl="2"/>
-            <a:r>
-              <a:rPr lang="en-US" dirty="0" smtClean="0"/>
-              <a:t>“//[</a:t>
-            </a:r>
-            <a:r>
-              <a:rPr lang="en-US" dirty="0"/>
-              <a:t>delimiter]\n[numbers…]” </a:t>
-            </a:r>
-            <a:endParaRPr lang="en-US" dirty="0" smtClean="0"/>
-          </a:p>
-          <a:p>
-            <a:pPr lvl="3"/>
-            <a:r>
-              <a:rPr lang="en-US" dirty="0" smtClean="0"/>
-              <a:t>for </a:t>
-            </a:r>
-            <a:r>
-              <a:rPr lang="en-US" dirty="0"/>
-              <a:t>example </a:t>
-            </a:r>
-            <a:r>
-              <a:rPr lang="en-US" dirty="0" smtClean="0"/>
-              <a:t>“//;\</a:t>
-            </a:r>
-            <a:r>
-              <a:rPr lang="en-US" dirty="0" smtClean="0"/>
-              <a:t>n1;2</a:t>
-            </a:r>
-            <a:r>
-              <a:rPr lang="en-US" dirty="0"/>
-              <a:t>” should return three where the default delimiter is ‘;’ .</a:t>
-            </a:r>
-          </a:p>
-          <a:p>
-            <a:pPr lvl="1"/>
-            <a:r>
-              <a:rPr lang="en-US" dirty="0"/>
-              <a:t>the first line is optional. all existing scenarios should still be supported</a:t>
-            </a:r>
-          </a:p>
-          <a:p>
-            <a:endParaRPr lang="en-US" dirty="0"/>
+              <a:t> there are multiple negatives, show all of them in the exception message</a:t>
+            </a:r>
           </a:p>
         </p:txBody>
       </p:sp>
@@ -3610,6 +3612,13 @@
   <p:clrMapOvr>
     <a:masterClrMapping/>
   </p:clrMapOvr>
+  <p:timing>
+    <p:tnLst>
+      <p:par>
+        <p:cTn id="1" dur="indefinite" restart="never" nodeType="tmRoot"/>
+      </p:par>
+    </p:tnLst>
+  </p:timing>
 </p:sld>
 </file>
 
@@ -3647,7 +3656,7 @@
           <a:p>
             <a:r>
               <a:rPr lang="en-US" dirty="0" smtClean="0"/>
-              <a:t>5</a:t>
+              <a:t>Bonus round</a:t>
             </a:r>
             <a:endParaRPr lang="en-US" dirty="0"/>
           </a:p>
@@ -3665,33 +3674,68 @@
         </p:nvSpPr>
         <p:spPr/>
         <p:txBody>
-          <a:bodyPr/>
-          <a:lstStyle/>
-          <a:p>
+          <a:bodyPr>
+            <a:normAutofit fontScale="92500" lnSpcReduction="10000"/>
+          </a:bodyPr>
+          <a:lstStyle/>
+          <a:p>
+            <a:pPr marL="514350" indent="-514350">
+              <a:buAutoNum type="arabicPlain" startAt="6"/>
+            </a:pPr>
+            <a:r>
+              <a:rPr lang="en-US" dirty="0" smtClean="0"/>
+              <a:t>bigger </a:t>
+            </a:r>
             <a:r>
               <a:rPr lang="en-US" dirty="0"/>
-              <a:t>Calling Add with a negative number will throw an exception “negatives not allowed” </a:t>
-            </a:r>
-            <a:endParaRPr lang="en-US" dirty="0" smtClean="0"/>
-          </a:p>
-          <a:p>
-            <a:pPr lvl="1"/>
+              <a:t>than 1000 should be ignored, so adding 2 + 1001  = </a:t>
+            </a:r>
             <a:r>
               <a:rPr lang="en-US" dirty="0" smtClean="0"/>
-              <a:t>and </a:t>
+              <a:t>2</a:t>
+            </a:r>
+          </a:p>
+          <a:p>
+            <a:pPr marL="514350" indent="-514350">
+              <a:buAutoNum type="arabicPlain" startAt="6"/>
+            </a:pPr>
+            <a:r>
+              <a:rPr lang="en-US" dirty="0" smtClean="0"/>
+              <a:t>Delimiters </a:t>
             </a:r>
             <a:r>
               <a:rPr lang="en-US" dirty="0"/>
-              <a:t>the negative that was </a:t>
-            </a:r>
-            <a:r>
-              <a:rPr lang="en-US" dirty="0" err="1"/>
-              <a:t>passed.if</a:t>
+              <a:t>can be of any length with the following format:  “//[delimiter]\n” for example: “//[***]\n1***2***3” should return 6</a:t>
+            </a:r>
+          </a:p>
+          <a:p>
+            <a:pPr>
+              <a:buNone/>
+            </a:pPr>
+            <a:r>
+              <a:rPr lang="en-US" dirty="0" smtClean="0"/>
+              <a:t>8	   Allow </a:t>
             </a:r>
             <a:r>
               <a:rPr lang="en-US" dirty="0"/>
-              <a:t> there are multiple negatives, show all of them in the exception message</a:t>
-            </a:r>
+              <a:t>multiple delimiters like this:  “//[delim1][delim2]\n” for example “//[*][%]\n1*2%3” should return 6.</a:t>
+            </a:r>
+          </a:p>
+          <a:p>
+            <a:pPr>
+              <a:buNone/>
+            </a:pPr>
+            <a:r>
+              <a:rPr lang="en-US" dirty="0" smtClean="0"/>
+              <a:t>9   make </a:t>
+            </a:r>
+            <a:r>
+              <a:rPr lang="en-US" dirty="0"/>
+              <a:t>sure you can also handle multiple delimiters with length longer than one char</a:t>
+            </a:r>
+          </a:p>
+          <a:p>
+            <a:endParaRPr lang="en-US" dirty="0"/>
           </a:p>
         </p:txBody>
       </p:sp>
@@ -3700,131 +3744,13 @@
   <p:clrMapOvr>
     <a:masterClrMapping/>
   </p:clrMapOvr>
-</p:sld>
-</file>
-
-<file path=ppt/slides/slide7.xml><?xml version="1.0" encoding="utf-8"?>
-<p:sld xmlns:a="http://schemas.openxmlformats.org/drawingml/2006/main" xmlns:r="http://schemas.openxmlformats.org/officeDocument/2006/relationships" xmlns:p="http://schemas.openxmlformats.org/presentationml/2006/main">
-  <p:cSld>
-    <p:spTree>
-      <p:nvGrpSpPr>
-        <p:cNvPr id="1" name=""/>
-        <p:cNvGrpSpPr/>
-        <p:nvPr/>
-      </p:nvGrpSpPr>
-      <p:grpSpPr>
-        <a:xfrm>
-          <a:off x="0" y="0"/>
-          <a:ext cx="0" cy="0"/>
-          <a:chOff x="0" y="0"/>
-          <a:chExt cx="0" cy="0"/>
-        </a:xfrm>
-      </p:grpSpPr>
-      <p:sp>
-        <p:nvSpPr>
-          <p:cNvPr id="2" name="Title 1"/>
-          <p:cNvSpPr>
-            <a:spLocks noGrp="1"/>
-          </p:cNvSpPr>
-          <p:nvPr>
-            <p:ph type="title"/>
-          </p:nvPr>
-        </p:nvSpPr>
-        <p:spPr/>
-        <p:txBody>
-          <a:bodyPr/>
-          <a:lstStyle/>
-          <a:p>
-            <a:r>
-              <a:rPr lang="en-US" dirty="0" smtClean="0"/>
-              <a:t>Bonus round</a:t>
-            </a:r>
-            <a:endParaRPr lang="en-US" dirty="0"/>
-          </a:p>
-        </p:txBody>
-      </p:sp>
-      <p:sp>
-        <p:nvSpPr>
-          <p:cNvPr id="3" name="Content Placeholder 2"/>
-          <p:cNvSpPr>
-            <a:spLocks noGrp="1"/>
-          </p:cNvSpPr>
-          <p:nvPr>
-            <p:ph idx="1"/>
-          </p:nvPr>
-        </p:nvSpPr>
-        <p:spPr/>
-        <p:txBody>
-          <a:bodyPr>
-            <a:normAutofit fontScale="92500" lnSpcReduction="10000"/>
-          </a:bodyPr>
-          <a:lstStyle/>
-          <a:p>
-            <a:pPr marL="514350" indent="-514350">
-              <a:buAutoNum type="arabicPlain" startAt="6"/>
-            </a:pPr>
-            <a:r>
-              <a:rPr lang="en-US" dirty="0" smtClean="0"/>
-              <a:t>bigger </a:t>
-            </a:r>
-            <a:r>
-              <a:rPr lang="en-US" dirty="0"/>
-              <a:t>than 1000 should be ignored, so adding 2 + 1001  = </a:t>
-            </a:r>
-            <a:r>
-              <a:rPr lang="en-US" dirty="0" smtClean="0"/>
-              <a:t>2</a:t>
-            </a:r>
-          </a:p>
-          <a:p>
-            <a:pPr marL="514350" indent="-514350">
-              <a:buAutoNum type="arabicPlain" startAt="6"/>
-            </a:pPr>
-            <a:r>
-              <a:rPr lang="en-US" dirty="0" smtClean="0"/>
-              <a:t>Delimiters </a:t>
-            </a:r>
-            <a:r>
-              <a:rPr lang="en-US" dirty="0"/>
-              <a:t>can be of any length with the following format:  “//[delimiter]\n” for example: “//[***]\n1***2***3” should return 6</a:t>
-            </a:r>
-          </a:p>
-          <a:p>
-            <a:pPr>
-              <a:buNone/>
-            </a:pPr>
-            <a:r>
-              <a:rPr lang="en-US" dirty="0" smtClean="0"/>
-              <a:t>8	   Allow </a:t>
-            </a:r>
-            <a:r>
-              <a:rPr lang="en-US" dirty="0"/>
-              <a:t>multiple delimiters like this:  “//[delim1][delim2]\n” for example “//[*][%]\n1*2%3” should return 6.</a:t>
-            </a:r>
-          </a:p>
-          <a:p>
-            <a:pPr>
-              <a:buNone/>
-            </a:pPr>
-            <a:r>
-              <a:rPr lang="en-US" dirty="0" smtClean="0"/>
-              <a:t>9   make </a:t>
-            </a:r>
-            <a:r>
-              <a:rPr lang="en-US" dirty="0"/>
-              <a:t>sure you can also handle multiple delimiters with length longer than one char</a:t>
-            </a:r>
-          </a:p>
-          <a:p>
-            <a:endParaRPr lang="en-US" dirty="0"/>
-          </a:p>
-        </p:txBody>
-      </p:sp>
-    </p:spTree>
-  </p:cSld>
-  <p:clrMapOvr>
-    <a:masterClrMapping/>
-  </p:clrMapOvr>
+  <p:timing>
+    <p:tnLst>
+      <p:par>
+        <p:cTn id="1" dur="indefinite" restart="never" nodeType="tmRoot"/>
+      </p:par>
+    </p:tnLst>
+  </p:timing>
 </p:sld>
 </file>
 

</xml_diff>